<commit_message>
updated background of graph
</commit_message>
<xml_diff>
--- a/assets/images/P2_graph.pptx
+++ b/assets/images/P2_graph.pptx
@@ -104,6 +104,11 @@
       </a:defRPr>
     </a:lvl9pPr>
   </p:defaultTextStyle>
+  <p:extLst>
+    <p:ext uri="{EFAFB233-063F-42B5-8137-9DF3F51BA10A}">
+      <p15:sldGuideLst xmlns:p15="http://schemas.microsoft.com/office/powerpoint/2012/main"/>
+    </p:ext>
+  </p:extLst>
 </p:presentation>
 </file>
 
@@ -254,7 +259,7 @@
           <a:p>
             <a:fld id="{5DF5789C-4AE1-4AF4-B289-91DF7B84D31E}" type="datetimeFigureOut">
               <a:rPr lang="en-US" smtClean="0"/>
-              <a:t>10/15/2020</a:t>
+              <a:t>12/8/2020</a:t>
             </a:fld>
             <a:endParaRPr lang="en-US"/>
           </a:p>
@@ -452,7 +457,7 @@
           <a:p>
             <a:fld id="{5DF5789C-4AE1-4AF4-B289-91DF7B84D31E}" type="datetimeFigureOut">
               <a:rPr lang="en-US" smtClean="0"/>
-              <a:t>10/15/2020</a:t>
+              <a:t>12/8/2020</a:t>
             </a:fld>
             <a:endParaRPr lang="en-US"/>
           </a:p>
@@ -660,7 +665,7 @@
           <a:p>
             <a:fld id="{5DF5789C-4AE1-4AF4-B289-91DF7B84D31E}" type="datetimeFigureOut">
               <a:rPr lang="en-US" smtClean="0"/>
-              <a:t>10/15/2020</a:t>
+              <a:t>12/8/2020</a:t>
             </a:fld>
             <a:endParaRPr lang="en-US"/>
           </a:p>
@@ -858,7 +863,7 @@
           <a:p>
             <a:fld id="{5DF5789C-4AE1-4AF4-B289-91DF7B84D31E}" type="datetimeFigureOut">
               <a:rPr lang="en-US" smtClean="0"/>
-              <a:t>10/15/2020</a:t>
+              <a:t>12/8/2020</a:t>
             </a:fld>
             <a:endParaRPr lang="en-US"/>
           </a:p>
@@ -1133,7 +1138,7 @@
           <a:p>
             <a:fld id="{5DF5789C-4AE1-4AF4-B289-91DF7B84D31E}" type="datetimeFigureOut">
               <a:rPr lang="en-US" smtClean="0"/>
-              <a:t>10/15/2020</a:t>
+              <a:t>12/8/2020</a:t>
             </a:fld>
             <a:endParaRPr lang="en-US"/>
           </a:p>
@@ -1398,7 +1403,7 @@
           <a:p>
             <a:fld id="{5DF5789C-4AE1-4AF4-B289-91DF7B84D31E}" type="datetimeFigureOut">
               <a:rPr lang="en-US" smtClean="0"/>
-              <a:t>10/15/2020</a:t>
+              <a:t>12/8/2020</a:t>
             </a:fld>
             <a:endParaRPr lang="en-US"/>
           </a:p>
@@ -1810,7 +1815,7 @@
           <a:p>
             <a:fld id="{5DF5789C-4AE1-4AF4-B289-91DF7B84D31E}" type="datetimeFigureOut">
               <a:rPr lang="en-US" smtClean="0"/>
-              <a:t>10/15/2020</a:t>
+              <a:t>12/8/2020</a:t>
             </a:fld>
             <a:endParaRPr lang="en-US"/>
           </a:p>
@@ -1951,7 +1956,7 @@
           <a:p>
             <a:fld id="{5DF5789C-4AE1-4AF4-B289-91DF7B84D31E}" type="datetimeFigureOut">
               <a:rPr lang="en-US" smtClean="0"/>
-              <a:t>10/15/2020</a:t>
+              <a:t>12/8/2020</a:t>
             </a:fld>
             <a:endParaRPr lang="en-US"/>
           </a:p>
@@ -2064,7 +2069,7 @@
           <a:p>
             <a:fld id="{5DF5789C-4AE1-4AF4-B289-91DF7B84D31E}" type="datetimeFigureOut">
               <a:rPr lang="en-US" smtClean="0"/>
-              <a:t>10/15/2020</a:t>
+              <a:t>12/8/2020</a:t>
             </a:fld>
             <a:endParaRPr lang="en-US"/>
           </a:p>
@@ -2375,7 +2380,7 @@
           <a:p>
             <a:fld id="{5DF5789C-4AE1-4AF4-B289-91DF7B84D31E}" type="datetimeFigureOut">
               <a:rPr lang="en-US" smtClean="0"/>
-              <a:t>10/15/2020</a:t>
+              <a:t>12/8/2020</a:t>
             </a:fld>
             <a:endParaRPr lang="en-US"/>
           </a:p>
@@ -2663,7 +2668,7 @@
           <a:p>
             <a:fld id="{5DF5789C-4AE1-4AF4-B289-91DF7B84D31E}" type="datetimeFigureOut">
               <a:rPr lang="en-US" smtClean="0"/>
-              <a:t>10/15/2020</a:t>
+              <a:t>12/8/2020</a:t>
             </a:fld>
             <a:endParaRPr lang="en-US"/>
           </a:p>
@@ -2904,7 +2909,7 @@
           <a:p>
             <a:fld id="{5DF5789C-4AE1-4AF4-B289-91DF7B84D31E}" type="datetimeFigureOut">
               <a:rPr lang="en-US" smtClean="0"/>
-              <a:t>10/15/2020</a:t>
+              <a:t>12/8/2020</a:t>
             </a:fld>
             <a:endParaRPr lang="en-US"/>
           </a:p>
@@ -3321,6 +3326,60 @@
           <a:chExt cx="0" cy="0"/>
         </a:xfrm>
       </p:grpSpPr>
+      <p:sp>
+        <p:nvSpPr>
+          <p:cNvPr id="2" name="Rectangle 1">
+            <a:extLst>
+              <a:ext uri="{FF2B5EF4-FFF2-40B4-BE49-F238E27FC236}">
+                <a16:creationId xmlns:a16="http://schemas.microsoft.com/office/drawing/2014/main" id="{1C2D45EE-5447-4B6E-9633-C54BFC5CAB97}"/>
+              </a:ext>
+            </a:extLst>
+          </p:cNvPr>
+          <p:cNvSpPr/>
+          <p:nvPr/>
+        </p:nvSpPr>
+        <p:spPr>
+          <a:xfrm>
+            <a:off x="407719" y="749100"/>
+            <a:ext cx="11376561" cy="5569528"/>
+          </a:xfrm>
+          <a:prstGeom prst="rect">
+            <a:avLst/>
+          </a:prstGeom>
+          <a:solidFill>
+            <a:schemeClr val="bg1"/>
+          </a:solidFill>
+          <a:ln>
+            <a:solidFill>
+              <a:schemeClr val="bg1"/>
+            </a:solidFill>
+          </a:ln>
+        </p:spPr>
+        <p:style>
+          <a:lnRef idx="2">
+            <a:schemeClr val="accent1">
+              <a:shade val="50000"/>
+            </a:schemeClr>
+          </a:lnRef>
+          <a:fillRef idx="1">
+            <a:schemeClr val="accent1"/>
+          </a:fillRef>
+          <a:effectRef idx="0">
+            <a:schemeClr val="accent1"/>
+          </a:effectRef>
+          <a:fontRef idx="minor">
+            <a:schemeClr val="lt1"/>
+          </a:fontRef>
+        </p:style>
+        <p:txBody>
+          <a:bodyPr rtlCol="0" anchor="ctr"/>
+          <a:lstStyle/>
+          <a:p>
+            <a:pPr algn="ctr"/>
+            <a:endParaRPr lang="en-US" dirty="0"/>
+          </a:p>
+        </p:txBody>
+      </p:sp>
       <p:grpSp>
         <p:nvGrpSpPr>
           <p:cNvPr id="111" name="Group 110">
@@ -3341,8 +3400,8 @@
             <a:chExt cx="10259819" cy="4310481"/>
           </a:xfrm>
         </p:grpSpPr>
-        <mc:AlternateContent xmlns:mc="http://schemas.openxmlformats.org/markup-compatibility/2006">
-          <mc:Choice xmlns:a14="http://schemas.microsoft.com/office/drawing/2010/main" Requires="a14">
+        <mc:AlternateContent xmlns:mc="http://schemas.openxmlformats.org/markup-compatibility/2006" xmlns:a14="http://schemas.microsoft.com/office/drawing/2010/main">
+          <mc:Choice Requires="a14">
             <p:sp>
               <p:nvSpPr>
                 <p:cNvPr id="4" name="Oval 3">
@@ -3405,7 +3464,7 @@
               </p:txBody>
             </p:sp>
           </mc:Choice>
-          <mc:Fallback>
+          <mc:Fallback xmlns="">
             <p:sp>
               <p:nvSpPr>
                 <p:cNvPr id="4" name="Oval 3">
@@ -3450,8 +3509,8 @@
             </p:sp>
           </mc:Fallback>
         </mc:AlternateContent>
-        <mc:AlternateContent xmlns:mc="http://schemas.openxmlformats.org/markup-compatibility/2006">
-          <mc:Choice xmlns:a14="http://schemas.microsoft.com/office/drawing/2010/main" Requires="a14">
+        <mc:AlternateContent xmlns:mc="http://schemas.openxmlformats.org/markup-compatibility/2006" xmlns:a14="http://schemas.microsoft.com/office/drawing/2010/main">
+          <mc:Choice Requires="a14">
             <p:sp>
               <p:nvSpPr>
                 <p:cNvPr id="10" name="Oval 9">
@@ -3514,7 +3573,7 @@
               </p:txBody>
             </p:sp>
           </mc:Choice>
-          <mc:Fallback>
+          <mc:Fallback xmlns="">
             <p:sp>
               <p:nvSpPr>
                 <p:cNvPr id="10" name="Oval 9">
@@ -3559,8 +3618,8 @@
             </p:sp>
           </mc:Fallback>
         </mc:AlternateContent>
-        <mc:AlternateContent xmlns:mc="http://schemas.openxmlformats.org/markup-compatibility/2006">
-          <mc:Choice xmlns:a14="http://schemas.microsoft.com/office/drawing/2010/main" Requires="a14">
+        <mc:AlternateContent xmlns:mc="http://schemas.openxmlformats.org/markup-compatibility/2006" xmlns:a14="http://schemas.microsoft.com/office/drawing/2010/main">
+          <mc:Choice Requires="a14">
             <p:sp>
               <p:nvSpPr>
                 <p:cNvPr id="12" name="Oval 11">
@@ -3642,7 +3701,7 @@
               </p:txBody>
             </p:sp>
           </mc:Choice>
-          <mc:Fallback>
+          <mc:Fallback xmlns="">
             <p:sp>
               <p:nvSpPr>
                 <p:cNvPr id="12" name="Oval 11">
@@ -3687,8 +3746,8 @@
             </p:sp>
           </mc:Fallback>
         </mc:AlternateContent>
-        <mc:AlternateContent xmlns:mc="http://schemas.openxmlformats.org/markup-compatibility/2006">
-          <mc:Choice xmlns:a14="http://schemas.microsoft.com/office/drawing/2010/main" Requires="a14">
+        <mc:AlternateContent xmlns:mc="http://schemas.openxmlformats.org/markup-compatibility/2006" xmlns:a14="http://schemas.microsoft.com/office/drawing/2010/main">
+          <mc:Choice Requires="a14">
             <p:sp>
               <p:nvSpPr>
                 <p:cNvPr id="14" name="Oval 13">
@@ -3770,7 +3829,7 @@
               </p:txBody>
             </p:sp>
           </mc:Choice>
-          <mc:Fallback>
+          <mc:Fallback xmlns="">
             <p:sp>
               <p:nvSpPr>
                 <p:cNvPr id="14" name="Oval 13">
@@ -3815,8 +3874,8 @@
             </p:sp>
           </mc:Fallback>
         </mc:AlternateContent>
-        <mc:AlternateContent xmlns:mc="http://schemas.openxmlformats.org/markup-compatibility/2006">
-          <mc:Choice xmlns:a14="http://schemas.microsoft.com/office/drawing/2010/main" Requires="a14">
+        <mc:AlternateContent xmlns:mc="http://schemas.openxmlformats.org/markup-compatibility/2006" xmlns:a14="http://schemas.microsoft.com/office/drawing/2010/main">
+          <mc:Choice Requires="a14">
             <p:sp>
               <p:nvSpPr>
                 <p:cNvPr id="16" name="Oval 15">
@@ -3898,7 +3957,7 @@
               </p:txBody>
             </p:sp>
           </mc:Choice>
-          <mc:Fallback>
+          <mc:Fallback xmlns="">
             <p:sp>
               <p:nvSpPr>
                 <p:cNvPr id="16" name="Oval 15">
@@ -3943,8 +4002,8 @@
             </p:sp>
           </mc:Fallback>
         </mc:AlternateContent>
-        <mc:AlternateContent xmlns:mc="http://schemas.openxmlformats.org/markup-compatibility/2006">
-          <mc:Choice xmlns:a14="http://schemas.microsoft.com/office/drawing/2010/main" Requires="a14">
+        <mc:AlternateContent xmlns:mc="http://schemas.openxmlformats.org/markup-compatibility/2006" xmlns:a14="http://schemas.microsoft.com/office/drawing/2010/main">
+          <mc:Choice Requires="a14">
             <p:sp>
               <p:nvSpPr>
                 <p:cNvPr id="18" name="Oval 17">
@@ -4026,7 +4085,7 @@
               </p:txBody>
             </p:sp>
           </mc:Choice>
-          <mc:Fallback>
+          <mc:Fallback xmlns="">
             <p:sp>
               <p:nvSpPr>
                 <p:cNvPr id="18" name="Oval 17">
@@ -4071,8 +4130,8 @@
             </p:sp>
           </mc:Fallback>
         </mc:AlternateContent>
-        <mc:AlternateContent xmlns:mc="http://schemas.openxmlformats.org/markup-compatibility/2006">
-          <mc:Choice xmlns:a14="http://schemas.microsoft.com/office/drawing/2010/main" Requires="a14">
+        <mc:AlternateContent xmlns:mc="http://schemas.openxmlformats.org/markup-compatibility/2006" xmlns:a14="http://schemas.microsoft.com/office/drawing/2010/main">
+          <mc:Choice Requires="a14">
             <p:sp>
               <p:nvSpPr>
                 <p:cNvPr id="20" name="Oval 19">
@@ -4154,7 +4213,7 @@
               </p:txBody>
             </p:sp>
           </mc:Choice>
-          <mc:Fallback>
+          <mc:Fallback xmlns="">
             <p:sp>
               <p:nvSpPr>
                 <p:cNvPr id="20" name="Oval 19">
@@ -4199,8 +4258,8 @@
             </p:sp>
           </mc:Fallback>
         </mc:AlternateContent>
-        <mc:AlternateContent xmlns:mc="http://schemas.openxmlformats.org/markup-compatibility/2006">
-          <mc:Choice xmlns:a14="http://schemas.microsoft.com/office/drawing/2010/main" Requires="a14">
+        <mc:AlternateContent xmlns:mc="http://schemas.openxmlformats.org/markup-compatibility/2006" xmlns:a14="http://schemas.microsoft.com/office/drawing/2010/main">
+          <mc:Choice Requires="a14">
             <p:sp>
               <p:nvSpPr>
                 <p:cNvPr id="22" name="Oval 21">
@@ -4282,7 +4341,7 @@
               </p:txBody>
             </p:sp>
           </mc:Choice>
-          <mc:Fallback>
+          <mc:Fallback xmlns="">
             <p:sp>
               <p:nvSpPr>
                 <p:cNvPr id="22" name="Oval 21">
@@ -4327,8 +4386,8 @@
             </p:sp>
           </mc:Fallback>
         </mc:AlternateContent>
-        <mc:AlternateContent xmlns:mc="http://schemas.openxmlformats.org/markup-compatibility/2006">
-          <mc:Choice xmlns:a14="http://schemas.microsoft.com/office/drawing/2010/main" Requires="a14">
+        <mc:AlternateContent xmlns:mc="http://schemas.openxmlformats.org/markup-compatibility/2006" xmlns:a14="http://schemas.microsoft.com/office/drawing/2010/main">
+          <mc:Choice Requires="a14">
             <p:sp>
               <p:nvSpPr>
                 <p:cNvPr id="24" name="Oval 23">
@@ -4410,7 +4469,7 @@
               </p:txBody>
             </p:sp>
           </mc:Choice>
-          <mc:Fallback>
+          <mc:Fallback xmlns="">
             <p:sp>
               <p:nvSpPr>
                 <p:cNvPr id="24" name="Oval 23">
@@ -4455,8 +4514,8 @@
             </p:sp>
           </mc:Fallback>
         </mc:AlternateContent>
-        <mc:AlternateContent xmlns:mc="http://schemas.openxmlformats.org/markup-compatibility/2006">
-          <mc:Choice xmlns:a14="http://schemas.microsoft.com/office/drawing/2010/main" Requires="a14">
+        <mc:AlternateContent xmlns:mc="http://schemas.openxmlformats.org/markup-compatibility/2006" xmlns:a14="http://schemas.microsoft.com/office/drawing/2010/main">
+          <mc:Choice Requires="a14">
             <p:sp>
               <p:nvSpPr>
                 <p:cNvPr id="26" name="Oval 25">
@@ -4538,7 +4597,7 @@
               </p:txBody>
             </p:sp>
           </mc:Choice>
-          <mc:Fallback>
+          <mc:Fallback xmlns="">
             <p:sp>
               <p:nvSpPr>
                 <p:cNvPr id="26" name="Oval 25">
@@ -4583,8 +4642,8 @@
             </p:sp>
           </mc:Fallback>
         </mc:AlternateContent>
-        <mc:AlternateContent xmlns:mc="http://schemas.openxmlformats.org/markup-compatibility/2006">
-          <mc:Choice xmlns:a14="http://schemas.microsoft.com/office/drawing/2010/main" Requires="a14">
+        <mc:AlternateContent xmlns:mc="http://schemas.openxmlformats.org/markup-compatibility/2006" xmlns:a14="http://schemas.microsoft.com/office/drawing/2010/main">
+          <mc:Choice Requires="a14">
             <p:sp>
               <p:nvSpPr>
                 <p:cNvPr id="28" name="Oval 27">
@@ -4666,7 +4725,7 @@
               </p:txBody>
             </p:sp>
           </mc:Choice>
-          <mc:Fallback>
+          <mc:Fallback xmlns="">
             <p:sp>
               <p:nvSpPr>
                 <p:cNvPr id="28" name="Oval 27">
@@ -4711,8 +4770,8 @@
             </p:sp>
           </mc:Fallback>
         </mc:AlternateContent>
-        <mc:AlternateContent xmlns:mc="http://schemas.openxmlformats.org/markup-compatibility/2006">
-          <mc:Choice xmlns:a14="http://schemas.microsoft.com/office/drawing/2010/main" Requires="a14">
+        <mc:AlternateContent xmlns:mc="http://schemas.openxmlformats.org/markup-compatibility/2006" xmlns:a14="http://schemas.microsoft.com/office/drawing/2010/main">
+          <mc:Choice Requires="a14">
             <p:sp>
               <p:nvSpPr>
                 <p:cNvPr id="30" name="Oval 29">
@@ -4794,7 +4853,7 @@
               </p:txBody>
             </p:sp>
           </mc:Choice>
-          <mc:Fallback>
+          <mc:Fallback xmlns="">
             <p:sp>
               <p:nvSpPr>
                 <p:cNvPr id="30" name="Oval 29">
@@ -4839,8 +4898,8 @@
             </p:sp>
           </mc:Fallback>
         </mc:AlternateContent>
-        <mc:AlternateContent xmlns:mc="http://schemas.openxmlformats.org/markup-compatibility/2006">
-          <mc:Choice xmlns:a14="http://schemas.microsoft.com/office/drawing/2010/main" Requires="a14">
+        <mc:AlternateContent xmlns:mc="http://schemas.openxmlformats.org/markup-compatibility/2006" xmlns:a14="http://schemas.microsoft.com/office/drawing/2010/main">
+          <mc:Choice Requires="a14">
             <p:sp>
               <p:nvSpPr>
                 <p:cNvPr id="32" name="Oval 31">
@@ -4922,7 +4981,7 @@
               </p:txBody>
             </p:sp>
           </mc:Choice>
-          <mc:Fallback>
+          <mc:Fallback xmlns="">
             <p:sp>
               <p:nvSpPr>
                 <p:cNvPr id="32" name="Oval 31">
@@ -4967,8 +5026,8 @@
             </p:sp>
           </mc:Fallback>
         </mc:AlternateContent>
-        <mc:AlternateContent xmlns:mc="http://schemas.openxmlformats.org/markup-compatibility/2006">
-          <mc:Choice xmlns:a14="http://schemas.microsoft.com/office/drawing/2010/main" Requires="a14">
+        <mc:AlternateContent xmlns:mc="http://schemas.openxmlformats.org/markup-compatibility/2006" xmlns:a14="http://schemas.microsoft.com/office/drawing/2010/main">
+          <mc:Choice Requires="a14">
             <p:sp>
               <p:nvSpPr>
                 <p:cNvPr id="34" name="Oval 33">
@@ -5050,7 +5109,7 @@
               </p:txBody>
             </p:sp>
           </mc:Choice>
-          <mc:Fallback>
+          <mc:Fallback xmlns="">
             <p:sp>
               <p:nvSpPr>
                 <p:cNvPr id="34" name="Oval 33">
@@ -5095,8 +5154,8 @@
             </p:sp>
           </mc:Fallback>
         </mc:AlternateContent>
-        <mc:AlternateContent xmlns:mc="http://schemas.openxmlformats.org/markup-compatibility/2006">
-          <mc:Choice xmlns:a14="http://schemas.microsoft.com/office/drawing/2010/main" Requires="a14">
+        <mc:AlternateContent xmlns:mc="http://schemas.openxmlformats.org/markup-compatibility/2006" xmlns:a14="http://schemas.microsoft.com/office/drawing/2010/main">
+          <mc:Choice Requires="a14">
             <p:sp>
               <p:nvSpPr>
                 <p:cNvPr id="36" name="Oval 35">
@@ -5166,13 +5225,7 @@
                               <a:rPr lang="en-US" b="0" i="1" smtClean="0">
                                 <a:latin typeface="Cambria Math" panose="02040503050406030204" pitchFamily="18" charset="0"/>
                               </a:rPr>
-                              <m:t>1</m:t>
-                            </m:r>
-                            <m:r>
-                              <a:rPr lang="en-US" b="0" i="1" smtClean="0">
-                                <a:latin typeface="Cambria Math" panose="02040503050406030204" pitchFamily="18" charset="0"/>
-                              </a:rPr>
-                              <m:t>3</m:t>
+                              <m:t>13</m:t>
                             </m:r>
                           </m:sub>
                         </m:sSub>
@@ -5184,7 +5237,7 @@
               </p:txBody>
             </p:sp>
           </mc:Choice>
-          <mc:Fallback>
+          <mc:Fallback xmlns="">
             <p:sp>
               <p:nvSpPr>
                 <p:cNvPr id="36" name="Oval 35">
@@ -5229,8 +5282,8 @@
             </p:sp>
           </mc:Fallback>
         </mc:AlternateContent>
-        <mc:AlternateContent xmlns:mc="http://schemas.openxmlformats.org/markup-compatibility/2006">
-          <mc:Choice xmlns:a14="http://schemas.microsoft.com/office/drawing/2010/main" Requires="a14">
+        <mc:AlternateContent xmlns:mc="http://schemas.openxmlformats.org/markup-compatibility/2006" xmlns:a14="http://schemas.microsoft.com/office/drawing/2010/main">
+          <mc:Choice Requires="a14">
             <p:sp>
               <p:nvSpPr>
                 <p:cNvPr id="38" name="Oval 37">
@@ -5293,7 +5346,7 @@
               </p:txBody>
             </p:sp>
           </mc:Choice>
-          <mc:Fallback>
+          <mc:Fallback xmlns="">
             <p:sp>
               <p:nvSpPr>
                 <p:cNvPr id="38" name="Oval 37">
@@ -6255,8 +6308,8 @@
             </a:p>
           </p:txBody>
         </p:sp>
-        <mc:AlternateContent xmlns:mc="http://schemas.openxmlformats.org/markup-compatibility/2006">
-          <mc:Choice xmlns:a14="http://schemas.microsoft.com/office/drawing/2010/main" Requires="a14">
+        <mc:AlternateContent xmlns:mc="http://schemas.openxmlformats.org/markup-compatibility/2006" xmlns:a14="http://schemas.microsoft.com/office/drawing/2010/main">
+          <mc:Choice Requires="a14">
             <p:sp>
               <p:nvSpPr>
                 <p:cNvPr id="85" name="TextBox 84">
@@ -6336,7 +6389,7 @@
               </p:txBody>
             </p:sp>
           </mc:Choice>
-          <mc:Fallback>
+          <mc:Fallback xmlns="">
             <p:sp>
               <p:nvSpPr>
                 <p:cNvPr id="85" name="TextBox 84">
@@ -6381,8 +6434,8 @@
             </p:sp>
           </mc:Fallback>
         </mc:AlternateContent>
-        <mc:AlternateContent xmlns:mc="http://schemas.openxmlformats.org/markup-compatibility/2006">
-          <mc:Choice xmlns:a14="http://schemas.microsoft.com/office/drawing/2010/main" Requires="a14">
+        <mc:AlternateContent xmlns:mc="http://schemas.openxmlformats.org/markup-compatibility/2006" xmlns:a14="http://schemas.microsoft.com/office/drawing/2010/main">
+          <mc:Choice Requires="a14">
             <p:sp>
               <p:nvSpPr>
                 <p:cNvPr id="87" name="TextBox 86">
@@ -6450,13 +6503,7 @@
                               <a:rPr lang="en-US" b="0" i="1" smtClean="0">
                                 <a:latin typeface="Cambria Math" panose="02040503050406030204" pitchFamily="18" charset="0"/>
                               </a:rPr>
-                              <m:t>1</m:t>
-                            </m:r>
-                            <m:r>
-                              <a:rPr lang="en-US" b="0" i="1" smtClean="0">
-                                <a:latin typeface="Cambria Math" panose="02040503050406030204" pitchFamily="18" charset="0"/>
-                              </a:rPr>
-                              <m:t>2</m:t>
+                              <m:t>12</m:t>
                             </m:r>
                           </m:sub>
                         </m:sSub>
@@ -6468,7 +6515,7 @@
               </p:txBody>
             </p:sp>
           </mc:Choice>
-          <mc:Fallback>
+          <mc:Fallback xmlns="">
             <p:sp>
               <p:nvSpPr>
                 <p:cNvPr id="87" name="TextBox 86">
@@ -6513,8 +6560,8 @@
             </p:sp>
           </mc:Fallback>
         </mc:AlternateContent>
-        <mc:AlternateContent xmlns:mc="http://schemas.openxmlformats.org/markup-compatibility/2006">
-          <mc:Choice xmlns:a14="http://schemas.microsoft.com/office/drawing/2010/main" Requires="a14">
+        <mc:AlternateContent xmlns:mc="http://schemas.openxmlformats.org/markup-compatibility/2006" xmlns:a14="http://schemas.microsoft.com/office/drawing/2010/main">
+          <mc:Choice Requires="a14">
             <p:sp>
               <p:nvSpPr>
                 <p:cNvPr id="89" name="TextBox 88">
@@ -6594,7 +6641,7 @@
               </p:txBody>
             </p:sp>
           </mc:Choice>
-          <mc:Fallback>
+          <mc:Fallback xmlns="">
             <p:sp>
               <p:nvSpPr>
                 <p:cNvPr id="89" name="TextBox 88">
@@ -6639,8 +6686,8 @@
             </p:sp>
           </mc:Fallback>
         </mc:AlternateContent>
-        <mc:AlternateContent xmlns:mc="http://schemas.openxmlformats.org/markup-compatibility/2006">
-          <mc:Choice xmlns:a14="http://schemas.microsoft.com/office/drawing/2010/main" Requires="a14">
+        <mc:AlternateContent xmlns:mc="http://schemas.openxmlformats.org/markup-compatibility/2006" xmlns:a14="http://schemas.microsoft.com/office/drawing/2010/main">
+          <mc:Choice Requires="a14">
             <p:sp>
               <p:nvSpPr>
                 <p:cNvPr id="91" name="TextBox 90">
@@ -6720,7 +6767,7 @@
               </p:txBody>
             </p:sp>
           </mc:Choice>
-          <mc:Fallback>
+          <mc:Fallback xmlns="">
             <p:sp>
               <p:nvSpPr>
                 <p:cNvPr id="91" name="TextBox 90">
@@ -6940,8 +6987,8 @@
             </a:p>
           </p:txBody>
         </p:sp>
-        <mc:AlternateContent xmlns:mc="http://schemas.openxmlformats.org/markup-compatibility/2006">
-          <mc:Choice xmlns:a14="http://schemas.microsoft.com/office/drawing/2010/main" Requires="a14">
+        <mc:AlternateContent xmlns:mc="http://schemas.openxmlformats.org/markup-compatibility/2006" xmlns:a14="http://schemas.microsoft.com/office/drawing/2010/main">
+          <mc:Choice Requires="a14">
             <p:sp>
               <p:nvSpPr>
                 <p:cNvPr id="105" name="TextBox 104">
@@ -7028,7 +7075,7 @@
               </p:txBody>
             </p:sp>
           </mc:Choice>
-          <mc:Fallback>
+          <mc:Fallback xmlns="">
             <p:sp>
               <p:nvSpPr>
                 <p:cNvPr id="105" name="TextBox 104">
@@ -7073,8 +7120,8 @@
             </p:sp>
           </mc:Fallback>
         </mc:AlternateContent>
-        <mc:AlternateContent xmlns:mc="http://schemas.openxmlformats.org/markup-compatibility/2006">
-          <mc:Choice xmlns:a14="http://schemas.microsoft.com/office/drawing/2010/main" Requires="a14">
+        <mc:AlternateContent xmlns:mc="http://schemas.openxmlformats.org/markup-compatibility/2006" xmlns:a14="http://schemas.microsoft.com/office/drawing/2010/main">
+          <mc:Choice Requires="a14">
             <p:sp>
               <p:nvSpPr>
                 <p:cNvPr id="110" name="TextBox 109">
@@ -7161,7 +7208,7 @@
               </p:txBody>
             </p:sp>
           </mc:Choice>
-          <mc:Fallback>
+          <mc:Fallback xmlns="">
             <p:sp>
               <p:nvSpPr>
                 <p:cNvPr id="110" name="TextBox 109">

</xml_diff>